<commit_message>
Add slide for session 05: Kubernetes Services
</commit_message>
<xml_diff>
--- a/session05 Kubernetes Services/k8s-course-session05 - Kubernetes Services.pptx
+++ b/session05 Kubernetes Services/k8s-course-session05 - Kubernetes Services.pptx
@@ -214,7 +214,7 @@
           <a:p>
             <a:fld id="{1090FF04-9902-4C25-9B83-E96EA3FF9EAB}" type="datetimeFigureOut">
               <a:rPr lang="en-US" smtClean="0"/>
-              <a:t>10/4/2022</a:t>
+              <a:t>10/12/2022</a:t>
             </a:fld>
             <a:endParaRPr lang="en-US"/>
           </a:p>
@@ -1843,7 +1843,7 @@
           <a:p>
             <a:fld id="{2F89291B-A39C-4BC5-B8A9-2AB198C227A9}" type="datetimeFigureOut">
               <a:rPr lang="en-US" smtClean="0"/>
-              <a:t>10/4/2022</a:t>
+              <a:t>10/12/2022</a:t>
             </a:fld>
             <a:endParaRPr lang="en-US"/>
           </a:p>
@@ -2118,7 +2118,7 @@
           <a:p>
             <a:fld id="{2F89291B-A39C-4BC5-B8A9-2AB198C227A9}" type="datetimeFigureOut">
               <a:rPr lang="en-US" smtClean="0"/>
-              <a:t>10/4/2022</a:t>
+              <a:t>10/12/2022</a:t>
             </a:fld>
             <a:endParaRPr lang="en-US"/>
           </a:p>
@@ -2312,7 +2312,7 @@
           <a:p>
             <a:fld id="{2F89291B-A39C-4BC5-B8A9-2AB198C227A9}" type="datetimeFigureOut">
               <a:rPr lang="en-US" smtClean="0"/>
-              <a:t>10/4/2022</a:t>
+              <a:t>10/12/2022</a:t>
             </a:fld>
             <a:endParaRPr lang="en-US"/>
           </a:p>
@@ -2585,7 +2585,7 @@
           <a:p>
             <a:fld id="{2F89291B-A39C-4BC5-B8A9-2AB198C227A9}" type="datetimeFigureOut">
               <a:rPr lang="en-US" smtClean="0"/>
-              <a:t>10/4/2022</a:t>
+              <a:t>10/12/2022</a:t>
             </a:fld>
             <a:endParaRPr lang="en-US"/>
           </a:p>
@@ -2926,7 +2926,7 @@
           <a:p>
             <a:fld id="{2F89291B-A39C-4BC5-B8A9-2AB198C227A9}" type="datetimeFigureOut">
               <a:rPr lang="en-US" smtClean="0"/>
-              <a:t>10/4/2022</a:t>
+              <a:t>10/12/2022</a:t>
             </a:fld>
             <a:endParaRPr lang="en-US"/>
           </a:p>
@@ -3549,7 +3549,7 @@
           <a:p>
             <a:fld id="{2F89291B-A39C-4BC5-B8A9-2AB198C227A9}" type="datetimeFigureOut">
               <a:rPr lang="en-US" smtClean="0"/>
-              <a:t>10/4/2022</a:t>
+              <a:t>10/12/2022</a:t>
             </a:fld>
             <a:endParaRPr lang="en-US"/>
           </a:p>
@@ -4409,7 +4409,7 @@
           <a:p>
             <a:fld id="{2F89291B-A39C-4BC5-B8A9-2AB198C227A9}" type="datetimeFigureOut">
               <a:rPr lang="en-US" smtClean="0"/>
-              <a:t>10/4/2022</a:t>
+              <a:t>10/12/2022</a:t>
             </a:fld>
             <a:endParaRPr lang="en-US"/>
           </a:p>
@@ -4579,7 +4579,7 @@
           <a:p>
             <a:fld id="{2F89291B-A39C-4BC5-B8A9-2AB198C227A9}" type="datetimeFigureOut">
               <a:rPr lang="en-US" smtClean="0"/>
-              <a:t>10/4/2022</a:t>
+              <a:t>10/12/2022</a:t>
             </a:fld>
             <a:endParaRPr lang="en-US"/>
           </a:p>
@@ -4759,7 +4759,7 @@
           <a:p>
             <a:fld id="{2F89291B-A39C-4BC5-B8A9-2AB198C227A9}" type="datetimeFigureOut">
               <a:rPr lang="en-US" smtClean="0"/>
-              <a:t>10/4/2022</a:t>
+              <a:t>10/12/2022</a:t>
             </a:fld>
             <a:endParaRPr lang="en-US"/>
           </a:p>
@@ -4929,7 +4929,7 @@
           <a:p>
             <a:fld id="{2F89291B-A39C-4BC5-B8A9-2AB198C227A9}" type="datetimeFigureOut">
               <a:rPr lang="en-US" smtClean="0"/>
-              <a:t>10/4/2022</a:t>
+              <a:t>10/12/2022</a:t>
             </a:fld>
             <a:endParaRPr lang="en-US"/>
           </a:p>
@@ -5176,7 +5176,7 @@
           <a:p>
             <a:fld id="{2F89291B-A39C-4BC5-B8A9-2AB198C227A9}" type="datetimeFigureOut">
               <a:rPr lang="en-US" smtClean="0"/>
-              <a:t>10/4/2022</a:t>
+              <a:t>10/12/2022</a:t>
             </a:fld>
             <a:endParaRPr lang="en-US"/>
           </a:p>
@@ -5468,7 +5468,7 @@
           <a:p>
             <a:fld id="{2F89291B-A39C-4BC5-B8A9-2AB198C227A9}" type="datetimeFigureOut">
               <a:rPr lang="en-US" smtClean="0"/>
-              <a:t>10/4/2022</a:t>
+              <a:t>10/12/2022</a:t>
             </a:fld>
             <a:endParaRPr lang="en-US"/>
           </a:p>
@@ -5912,7 +5912,7 @@
           <a:p>
             <a:fld id="{2F89291B-A39C-4BC5-B8A9-2AB198C227A9}" type="datetimeFigureOut">
               <a:rPr lang="en-US" smtClean="0"/>
-              <a:t>10/4/2022</a:t>
+              <a:t>10/12/2022</a:t>
             </a:fld>
             <a:endParaRPr lang="en-US"/>
           </a:p>
@@ -6030,7 +6030,7 @@
           <a:p>
             <a:fld id="{2F89291B-A39C-4BC5-B8A9-2AB198C227A9}" type="datetimeFigureOut">
               <a:rPr lang="en-US" smtClean="0"/>
-              <a:t>10/4/2022</a:t>
+              <a:t>10/12/2022</a:t>
             </a:fld>
             <a:endParaRPr lang="en-US"/>
           </a:p>
@@ -6125,7 +6125,7 @@
           <a:p>
             <a:fld id="{2F89291B-A39C-4BC5-B8A9-2AB198C227A9}" type="datetimeFigureOut">
               <a:rPr lang="en-US" smtClean="0"/>
-              <a:t>10/4/2022</a:t>
+              <a:t>10/12/2022</a:t>
             </a:fld>
             <a:endParaRPr lang="en-US"/>
           </a:p>
@@ -6404,7 +6404,7 @@
           <a:p>
             <a:fld id="{2F89291B-A39C-4BC5-B8A9-2AB198C227A9}" type="datetimeFigureOut">
               <a:rPr lang="en-US" smtClean="0"/>
-              <a:t>10/4/2022</a:t>
+              <a:t>10/12/2022</a:t>
             </a:fld>
             <a:endParaRPr lang="en-US"/>
           </a:p>
@@ -6679,7 +6679,7 @@
           <a:p>
             <a:fld id="{2F89291B-A39C-4BC5-B8A9-2AB198C227A9}" type="datetimeFigureOut">
               <a:rPr lang="en-US" smtClean="0"/>
-              <a:t>10/4/2022</a:t>
+              <a:t>10/12/2022</a:t>
             </a:fld>
             <a:endParaRPr lang="en-US"/>
           </a:p>
@@ -7108,7 +7108,7 @@
           <a:p>
             <a:fld id="{2F89291B-A39C-4BC5-B8A9-2AB198C227A9}" type="datetimeFigureOut">
               <a:rPr lang="en-US" smtClean="0"/>
-              <a:t>10/4/2022</a:t>
+              <a:t>10/12/2022</a:t>
             </a:fld>
             <a:endParaRPr lang="en-US"/>
           </a:p>
@@ -8073,10 +8073,10 @@
       </p:sp>
       <p:pic>
         <p:nvPicPr>
-          <p:cNvPr id="12" name="Picture 11">
+          <p:cNvPr id="4" name="Picture 3">
             <a:extLst>
               <a:ext uri="{FF2B5EF4-FFF2-40B4-BE49-F238E27FC236}">
-                <a16:creationId xmlns:a16="http://schemas.microsoft.com/office/drawing/2014/main" id="{4E9A9000-B136-80EC-492B-5DD87DC5E45D}"/>
+                <a16:creationId xmlns:a16="http://schemas.microsoft.com/office/drawing/2014/main" id="{B1C7BF6A-B16F-FBE3-04FF-D52DE32F6C68}"/>
               </a:ext>
             </a:extLst>
           </p:cNvPr>
@@ -8099,8 +8099,8 @@
         </p:blipFill>
         <p:spPr>
           <a:xfrm>
-            <a:off x="3118576" y="934194"/>
-            <a:ext cx="5143681" cy="5923806"/>
+            <a:off x="3534747" y="954506"/>
+            <a:ext cx="5638800" cy="5638800"/>
           </a:xfrm>
           <a:prstGeom prst="rect">
             <a:avLst/>
@@ -13076,7 +13076,7 @@
         <p:spPr>
           <a:xfrm>
             <a:off x="1259633" y="1184988"/>
-            <a:ext cx="9789885" cy="4921797"/>
+            <a:ext cx="9789885" cy="4090800"/>
           </a:xfrm>
           <a:prstGeom prst="rect">
             <a:avLst/>
@@ -13111,22 +13111,8 @@
             </a:pPr>
             <a:r>
               <a:rPr lang="en-US" dirty="0"/>
-              <a:t>Deployment</a:t>
+              <a:t>Service</a:t>
             </a:r>
-          </a:p>
-          <a:p>
-            <a:pPr marL="285750" indent="-285750">
-              <a:lnSpc>
-                <a:spcPct val="300000"/>
-              </a:lnSpc>
-              <a:buFont typeface="Wingdings" panose="05000000000000000000" pitchFamily="2" charset="2"/>
-              <a:buChar char="Ø"/>
-            </a:pPr>
-            <a:r>
-              <a:rPr lang="en-US" dirty="0" err="1"/>
-              <a:t>ReplicaSet</a:t>
-            </a:r>
-            <a:endParaRPr lang="en-US" dirty="0"/>
           </a:p>
           <a:p>
             <a:pPr marL="285750" indent="-285750">
@@ -13138,13 +13124,8 @@
             </a:pPr>
             <a:r>
               <a:rPr lang="en-US" dirty="0"/>
-              <a:t>Working with Deployment and </a:t>
+              <a:t>Service type</a:t>
             </a:r>
-            <a:r>
-              <a:rPr lang="en-US" dirty="0" err="1"/>
-              <a:t>ReplicaSet</a:t>
-            </a:r>
-            <a:endParaRPr lang="en-US" dirty="0"/>
           </a:p>
           <a:p>
             <a:pPr marL="285750" indent="-285750">
@@ -13649,7 +13630,7 @@
         <p:spPr>
           <a:xfrm>
             <a:off x="1259633" y="1184988"/>
-            <a:ext cx="9789885" cy="5510419"/>
+            <a:ext cx="9789885" cy="2047933"/>
           </a:xfrm>
           <a:prstGeom prst="rect">
             <a:avLst/>
@@ -13671,15 +13652,7 @@
             </a:pPr>
             <a:r>
               <a:rPr lang="en-US" sz="1800" dirty="0"/>
-              <a:t>Pod component: </a:t>
-            </a:r>
-            <a:r>
-              <a:rPr lang="en-US" sz="1800" dirty="0" err="1"/>
-              <a:t>ApiVersion</a:t>
-            </a:r>
-            <a:r>
-              <a:rPr lang="en-US" sz="1800" dirty="0"/>
-              <a:t>, Kind, Metadata, Spec</a:t>
+              <a:t>Deployment</a:t>
             </a:r>
           </a:p>
           <a:p>
@@ -13692,205 +13665,13 @@
             </a:pPr>
             <a:r>
               <a:rPr lang="en-US" dirty="0" err="1"/>
-              <a:t>kubectl</a:t>
+              <a:t>Replicaset</a:t>
             </a:r>
-            <a:r>
-              <a:rPr lang="en-US" dirty="0"/>
-              <a:t> command with pod</a:t>
-            </a:r>
-          </a:p>
-          <a:p>
-            <a:pPr marL="742950" lvl="1" indent="-285750">
-              <a:lnSpc>
-                <a:spcPct val="250000"/>
-              </a:lnSpc>
-              <a:buFont typeface="Wingdings" panose="05000000000000000000" pitchFamily="2" charset="2"/>
-              <a:buChar char="Ø"/>
-            </a:pPr>
-            <a:r>
-              <a:rPr lang="en-US" dirty="0" err="1"/>
-              <a:t>kubectl</a:t>
-            </a:r>
-            <a:r>
-              <a:rPr lang="en-US" dirty="0"/>
-              <a:t> </a:t>
-            </a:r>
-            <a:r>
-              <a:rPr lang="en-US" b="1" dirty="0">
-                <a:solidFill>
-                  <a:srgbClr val="00B0F0"/>
-                </a:solidFill>
-              </a:rPr>
-              <a:t>run</a:t>
-            </a:r>
-            <a:r>
-              <a:rPr lang="en-US" dirty="0"/>
-              <a:t> [pod-name] --image=[image-name] --port=[Port]</a:t>
-            </a:r>
-          </a:p>
-          <a:p>
-            <a:pPr marL="742950" lvl="1" indent="-285750">
-              <a:lnSpc>
-                <a:spcPct val="250000"/>
-              </a:lnSpc>
-              <a:buFont typeface="Wingdings" panose="05000000000000000000" pitchFamily="2" charset="2"/>
-              <a:buChar char="Ø"/>
-            </a:pPr>
-            <a:r>
-              <a:rPr lang="en-US" dirty="0" err="1"/>
-              <a:t>kubectl</a:t>
-            </a:r>
-            <a:r>
-              <a:rPr lang="en-US" dirty="0"/>
-              <a:t> </a:t>
-            </a:r>
-            <a:r>
-              <a:rPr lang="en-US" b="1" dirty="0">
-                <a:solidFill>
-                  <a:srgbClr val="00B0F0"/>
-                </a:solidFill>
-              </a:rPr>
-              <a:t>run</a:t>
-            </a:r>
-            <a:r>
-              <a:rPr lang="en-US" dirty="0"/>
-              <a:t> [pod] --image=[image] --port=[Port] </a:t>
-            </a:r>
-            <a:r>
-              <a:rPr lang="en-US" dirty="0">
-                <a:solidFill>
-                  <a:srgbClr val="FFFF00"/>
-                </a:solidFill>
-              </a:rPr>
-              <a:t>[--dry-run=client -</a:t>
-            </a:r>
-            <a:r>
-              <a:rPr lang="en-US" dirty="0" err="1">
-                <a:solidFill>
-                  <a:srgbClr val="FFFF00"/>
-                </a:solidFill>
-              </a:rPr>
-              <a:t>oyaml</a:t>
-            </a:r>
-            <a:r>
-              <a:rPr lang="en-US" dirty="0">
-                <a:solidFill>
-                  <a:srgbClr val="FFFF00"/>
-                </a:solidFill>
-              </a:rPr>
-              <a:t>]</a:t>
-            </a:r>
-          </a:p>
-          <a:p>
-            <a:pPr marL="742950" lvl="1" indent="-285750">
-              <a:lnSpc>
-                <a:spcPct val="250000"/>
-              </a:lnSpc>
-              <a:buFont typeface="Wingdings" panose="05000000000000000000" pitchFamily="2" charset="2"/>
-              <a:buChar char="Ø"/>
-            </a:pPr>
-            <a:r>
-              <a:rPr lang="en-US" dirty="0" err="1"/>
-              <a:t>kubectl</a:t>
-            </a:r>
-            <a:r>
-              <a:rPr lang="en-US" dirty="0"/>
-              <a:t> </a:t>
-            </a:r>
-            <a:r>
-              <a:rPr lang="en-US" b="1" dirty="0">
-                <a:solidFill>
-                  <a:srgbClr val="00B0F0"/>
-                </a:solidFill>
-              </a:rPr>
-              <a:t>get</a:t>
-            </a:r>
-            <a:r>
-              <a:rPr lang="en-US" dirty="0"/>
-              <a:t> pods </a:t>
-            </a:r>
-            <a:r>
-              <a:rPr lang="en-US" dirty="0">
-                <a:solidFill>
-                  <a:srgbClr val="FFFF00"/>
-                </a:solidFill>
-              </a:rPr>
-              <a:t>[-n namespace-name]</a:t>
-            </a:r>
-          </a:p>
-          <a:p>
-            <a:pPr marL="742950" lvl="1" indent="-285750">
-              <a:lnSpc>
-                <a:spcPct val="250000"/>
-              </a:lnSpc>
-              <a:buFont typeface="Wingdings" panose="05000000000000000000" pitchFamily="2" charset="2"/>
-              <a:buChar char="Ø"/>
-            </a:pPr>
-            <a:r>
-              <a:rPr lang="en-US" dirty="0" err="1"/>
-              <a:t>kubectl</a:t>
-            </a:r>
-            <a:r>
-              <a:rPr lang="en-US" dirty="0"/>
-              <a:t> </a:t>
-            </a:r>
-            <a:r>
-              <a:rPr lang="en-US" b="1" dirty="0">
-                <a:solidFill>
-                  <a:srgbClr val="00B0F0"/>
-                </a:solidFill>
-              </a:rPr>
-              <a:t>describe</a:t>
-            </a:r>
-            <a:r>
-              <a:rPr lang="en-US" dirty="0"/>
-              <a:t> pod [pod-name] </a:t>
-            </a:r>
-            <a:r>
-              <a:rPr lang="en-US" dirty="0">
-                <a:solidFill>
-                  <a:srgbClr val="FFFF00"/>
-                </a:solidFill>
-              </a:rPr>
-              <a:t>[-n namespace-name]</a:t>
-            </a:r>
-          </a:p>
-          <a:p>
-            <a:pPr marL="742950" lvl="1" indent="-285750">
-              <a:lnSpc>
-                <a:spcPct val="250000"/>
-              </a:lnSpc>
-              <a:buFont typeface="Wingdings" panose="05000000000000000000" pitchFamily="2" charset="2"/>
-              <a:buChar char="Ø"/>
-            </a:pPr>
-            <a:r>
-              <a:rPr lang="en-US" dirty="0" err="1"/>
-              <a:t>kubectl</a:t>
-            </a:r>
-            <a:r>
-              <a:rPr lang="en-US" dirty="0"/>
-              <a:t> </a:t>
-            </a:r>
-            <a:r>
-              <a:rPr lang="en-US" b="1" dirty="0">
-                <a:solidFill>
-                  <a:srgbClr val="00B0F0"/>
-                </a:solidFill>
-              </a:rPr>
-              <a:t>exec -it</a:t>
-            </a:r>
-            <a:r>
-              <a:rPr lang="en-US" dirty="0"/>
-              <a:t> [pod-name] – [command] </a:t>
-            </a:r>
-            <a:r>
-              <a:rPr lang="en-US" dirty="0">
-                <a:solidFill>
-                  <a:srgbClr val="FFFF00"/>
-                </a:solidFill>
-              </a:rPr>
-              <a:t>[-n namespace-name]</a:t>
-            </a:r>
+            <a:endParaRPr lang="en-US" dirty="0">
+              <a:solidFill>
+                <a:srgbClr val="FFFF00"/>
+              </a:solidFill>
+            </a:endParaRPr>
           </a:p>
           <a:p>
             <a:pPr marL="742950" lvl="1" indent="-285750">

</xml_diff>